<commit_message>
Added mid 02 material and rearragned some things
</commit_message>
<xml_diff>
--- a/AML - Sir Shahzad/Lectures/Mid II/Lecture 10 Ensemble Learning.pptx
+++ b/AML - Sir Shahzad/Lectures/Mid II/Lecture 10 Ensemble Learning.pptx
@@ -250,7 +250,7 @@
           <a:p>
             <a:fld id="{FEC88E03-A2DE-4DC2-8C41-58572FEEC274}" type="datetimeFigureOut">
               <a:rPr lang="en-US" smtClean="0"/>
-              <a:t>5/8/2023</a:t>
+              <a:t>11/8/2023</a:t>
             </a:fld>
             <a:endParaRPr lang="en-US"/>
           </a:p>
@@ -1488,7 +1488,7 @@
           <a:p>
             <a:fld id="{B66CF0E1-FC16-4F6A-915E-E08F428BFFDA}" type="datetimeFigureOut">
               <a:rPr lang="en-US" smtClean="0"/>
-              <a:t>5/8/2023</a:t>
+              <a:t>11/8/2023</a:t>
             </a:fld>
             <a:endParaRPr lang="en-US"/>
           </a:p>
@@ -1651,7 +1651,7 @@
           <a:p>
             <a:fld id="{B66CF0E1-FC16-4F6A-915E-E08F428BFFDA}" type="datetimeFigureOut">
               <a:rPr lang="en-US" smtClean="0"/>
-              <a:t>5/8/2023</a:t>
+              <a:t>11/8/2023</a:t>
             </a:fld>
             <a:endParaRPr lang="en-US"/>
           </a:p>
@@ -1824,7 +1824,7 @@
           <a:p>
             <a:fld id="{B66CF0E1-FC16-4F6A-915E-E08F428BFFDA}" type="datetimeFigureOut">
               <a:rPr lang="en-US" smtClean="0"/>
-              <a:t>5/8/2023</a:t>
+              <a:t>11/8/2023</a:t>
             </a:fld>
             <a:endParaRPr lang="en-US"/>
           </a:p>
@@ -1987,7 +1987,7 @@
           <a:p>
             <a:fld id="{B66CF0E1-FC16-4F6A-915E-E08F428BFFDA}" type="datetimeFigureOut">
               <a:rPr lang="en-US" smtClean="0"/>
-              <a:t>5/8/2023</a:t>
+              <a:t>11/8/2023</a:t>
             </a:fld>
             <a:endParaRPr lang="en-US"/>
           </a:p>
@@ -2227,7 +2227,7 @@
           <a:p>
             <a:fld id="{B66CF0E1-FC16-4F6A-915E-E08F428BFFDA}" type="datetimeFigureOut">
               <a:rPr lang="en-US" smtClean="0"/>
-              <a:t>5/8/2023</a:t>
+              <a:t>11/8/2023</a:t>
             </a:fld>
             <a:endParaRPr lang="en-US"/>
           </a:p>
@@ -2507,7 +2507,7 @@
           <a:p>
             <a:fld id="{B66CF0E1-FC16-4F6A-915E-E08F428BFFDA}" type="datetimeFigureOut">
               <a:rPr lang="en-US" smtClean="0"/>
-              <a:t>5/8/2023</a:t>
+              <a:t>11/8/2023</a:t>
             </a:fld>
             <a:endParaRPr lang="en-US"/>
           </a:p>
@@ -2921,7 +2921,7 @@
           <a:p>
             <a:fld id="{B66CF0E1-FC16-4F6A-915E-E08F428BFFDA}" type="datetimeFigureOut">
               <a:rPr lang="en-US" smtClean="0"/>
-              <a:t>5/8/2023</a:t>
+              <a:t>11/8/2023</a:t>
             </a:fld>
             <a:endParaRPr lang="en-US"/>
           </a:p>
@@ -3033,7 +3033,7 @@
           <a:p>
             <a:fld id="{B66CF0E1-FC16-4F6A-915E-E08F428BFFDA}" type="datetimeFigureOut">
               <a:rPr lang="en-US" smtClean="0"/>
-              <a:t>5/8/2023</a:t>
+              <a:t>11/8/2023</a:t>
             </a:fld>
             <a:endParaRPr lang="en-US"/>
           </a:p>
@@ -3123,7 +3123,7 @@
           <a:p>
             <a:fld id="{B66CF0E1-FC16-4F6A-915E-E08F428BFFDA}" type="datetimeFigureOut">
               <a:rPr lang="en-US" smtClean="0"/>
-              <a:t>5/8/2023</a:t>
+              <a:t>11/8/2023</a:t>
             </a:fld>
             <a:endParaRPr lang="en-US"/>
           </a:p>
@@ -3393,7 +3393,7 @@
           <a:p>
             <a:fld id="{B66CF0E1-FC16-4F6A-915E-E08F428BFFDA}" type="datetimeFigureOut">
               <a:rPr lang="en-US" smtClean="0"/>
-              <a:t>5/8/2023</a:t>
+              <a:t>11/8/2023</a:t>
             </a:fld>
             <a:endParaRPr lang="en-US"/>
           </a:p>
@@ -3640,7 +3640,7 @@
           <a:p>
             <a:fld id="{B66CF0E1-FC16-4F6A-915E-E08F428BFFDA}" type="datetimeFigureOut">
               <a:rPr lang="en-US" smtClean="0"/>
-              <a:t>5/8/2023</a:t>
+              <a:t>11/8/2023</a:t>
             </a:fld>
             <a:endParaRPr lang="en-US"/>
           </a:p>
@@ -3846,7 +3846,7 @@
           <a:p>
             <a:fld id="{B66CF0E1-FC16-4F6A-915E-E08F428BFFDA}" type="datetimeFigureOut">
               <a:rPr lang="en-US" smtClean="0"/>
-              <a:t>5/8/2023</a:t>
+              <a:t>11/8/2023</a:t>
             </a:fld>
             <a:endParaRPr lang="en-US"/>
           </a:p>
@@ -6420,25 +6420,6 @@
       </p:sp>
       <p:sp>
         <p:nvSpPr>
-          <p:cNvPr id="3" name="Content Placeholder 2"/>
-          <p:cNvSpPr>
-            <a:spLocks noGrp="1"/>
-          </p:cNvSpPr>
-          <p:nvPr>
-            <p:ph idx="1"/>
-          </p:nvPr>
-        </p:nvSpPr>
-        <p:spPr/>
-        <p:txBody>
-          <a:bodyPr/>
-          <a:lstStyle/>
-          <a:p>
-            <a:endParaRPr lang="en-US" dirty="0"/>
-          </a:p>
-        </p:txBody>
-      </p:sp>
-      <p:sp>
-        <p:nvSpPr>
           <p:cNvPr id="4" name="Content Placeholder 2"/>
           <p:cNvSpPr txBox="1">
             <a:spLocks/>
@@ -7109,25 +7090,6 @@
       </p:sp>
       <p:sp>
         <p:nvSpPr>
-          <p:cNvPr id="3" name="Content Placeholder 2"/>
-          <p:cNvSpPr>
-            <a:spLocks noGrp="1"/>
-          </p:cNvSpPr>
-          <p:nvPr>
-            <p:ph idx="1"/>
-          </p:nvPr>
-        </p:nvSpPr>
-        <p:spPr/>
-        <p:txBody>
-          <a:bodyPr/>
-          <a:lstStyle/>
-          <a:p>
-            <a:endParaRPr lang="en-US" dirty="0"/>
-          </a:p>
-        </p:txBody>
-      </p:sp>
-      <p:sp>
-        <p:nvSpPr>
           <p:cNvPr id="4" name="Content Placeholder 2"/>
           <p:cNvSpPr txBox="1">
             <a:spLocks/>
@@ -7402,25 +7364,6 @@
       </p:sp>
       <p:sp>
         <p:nvSpPr>
-          <p:cNvPr id="3" name="Content Placeholder 2"/>
-          <p:cNvSpPr>
-            <a:spLocks noGrp="1"/>
-          </p:cNvSpPr>
-          <p:nvPr>
-            <p:ph idx="1"/>
-          </p:nvPr>
-        </p:nvSpPr>
-        <p:spPr/>
-        <p:txBody>
-          <a:bodyPr/>
-          <a:lstStyle/>
-          <a:p>
-            <a:endParaRPr lang="en-US" dirty="0"/>
-          </a:p>
-        </p:txBody>
-      </p:sp>
-      <p:sp>
-        <p:nvSpPr>
           <p:cNvPr id="4" name="Content Placeholder 2"/>
           <p:cNvSpPr txBox="1">
             <a:spLocks/>
@@ -8227,25 +8170,6 @@
       </p:sp>
       <p:sp>
         <p:nvSpPr>
-          <p:cNvPr id="3" name="Content Placeholder 2"/>
-          <p:cNvSpPr>
-            <a:spLocks noGrp="1"/>
-          </p:cNvSpPr>
-          <p:nvPr>
-            <p:ph idx="1"/>
-          </p:nvPr>
-        </p:nvSpPr>
-        <p:spPr/>
-        <p:txBody>
-          <a:bodyPr/>
-          <a:lstStyle/>
-          <a:p>
-            <a:endParaRPr lang="en-US" dirty="0"/>
-          </a:p>
-        </p:txBody>
-      </p:sp>
-      <p:sp>
-        <p:nvSpPr>
           <p:cNvPr id="4" name="Content Placeholder 2"/>
           <p:cNvSpPr txBox="1">
             <a:spLocks/>
@@ -9352,25 +9276,6 @@
               <a:rPr lang="en-US" dirty="0"/>
               <a:t> Example</a:t>
             </a:r>
-          </a:p>
-        </p:txBody>
-      </p:sp>
-      <p:sp>
-        <p:nvSpPr>
-          <p:cNvPr id="3" name="Content Placeholder 2"/>
-          <p:cNvSpPr>
-            <a:spLocks noGrp="1"/>
-          </p:cNvSpPr>
-          <p:nvPr>
-            <p:ph idx="1"/>
-          </p:nvPr>
-        </p:nvSpPr>
-        <p:spPr/>
-        <p:txBody>
-          <a:bodyPr/>
-          <a:lstStyle/>
-          <a:p>
-            <a:endParaRPr lang="en-US" dirty="0"/>
           </a:p>
         </p:txBody>
       </p:sp>
@@ -9734,25 +9639,6 @@
       </p:sp>
       <p:sp>
         <p:nvSpPr>
-          <p:cNvPr id="3" name="Content Placeholder 2"/>
-          <p:cNvSpPr>
-            <a:spLocks noGrp="1"/>
-          </p:cNvSpPr>
-          <p:nvPr>
-            <p:ph idx="1"/>
-          </p:nvPr>
-        </p:nvSpPr>
-        <p:spPr/>
-        <p:txBody>
-          <a:bodyPr/>
-          <a:lstStyle/>
-          <a:p>
-            <a:endParaRPr lang="en-US" dirty="0"/>
-          </a:p>
-        </p:txBody>
-      </p:sp>
-      <p:sp>
-        <p:nvSpPr>
           <p:cNvPr id="4" name="Content Placeholder 2"/>
           <p:cNvSpPr txBox="1">
             <a:spLocks/>
@@ -11263,25 +11149,6 @@
               <a:rPr lang="en-US" dirty="0"/>
               <a:t> Example</a:t>
             </a:r>
-          </a:p>
-        </p:txBody>
-      </p:sp>
-      <p:sp>
-        <p:nvSpPr>
-          <p:cNvPr id="3" name="Content Placeholder 2"/>
-          <p:cNvSpPr>
-            <a:spLocks noGrp="1"/>
-          </p:cNvSpPr>
-          <p:nvPr>
-            <p:ph idx="1"/>
-          </p:nvPr>
-        </p:nvSpPr>
-        <p:spPr/>
-        <p:txBody>
-          <a:bodyPr/>
-          <a:lstStyle/>
-          <a:p>
-            <a:endParaRPr lang="en-US"/>
           </a:p>
         </p:txBody>
       </p:sp>
@@ -13061,25 +12928,6 @@
       </p:sp>
       <p:sp>
         <p:nvSpPr>
-          <p:cNvPr id="3" name="Content Placeholder 2"/>
-          <p:cNvSpPr>
-            <a:spLocks noGrp="1"/>
-          </p:cNvSpPr>
-          <p:nvPr>
-            <p:ph idx="1"/>
-          </p:nvPr>
-        </p:nvSpPr>
-        <p:spPr/>
-        <p:txBody>
-          <a:bodyPr/>
-          <a:lstStyle/>
-          <a:p>
-            <a:endParaRPr lang="en-US" dirty="0"/>
-          </a:p>
-        </p:txBody>
-      </p:sp>
-      <p:sp>
-        <p:nvSpPr>
           <p:cNvPr id="4" name="Content Placeholder 2"/>
           <p:cNvSpPr txBox="1">
             <a:spLocks/>
@@ -14990,25 +14838,6 @@
               <a:rPr lang="en-US" dirty="0"/>
               <a:t> Example</a:t>
             </a:r>
-          </a:p>
-        </p:txBody>
-      </p:sp>
-      <p:sp>
-        <p:nvSpPr>
-          <p:cNvPr id="3" name="Content Placeholder 2"/>
-          <p:cNvSpPr>
-            <a:spLocks noGrp="1"/>
-          </p:cNvSpPr>
-          <p:nvPr>
-            <p:ph idx="1"/>
-          </p:nvPr>
-        </p:nvSpPr>
-        <p:spPr/>
-        <p:txBody>
-          <a:bodyPr/>
-          <a:lstStyle/>
-          <a:p>
-            <a:endParaRPr lang="en-US" dirty="0"/>
           </a:p>
         </p:txBody>
       </p:sp>
@@ -16927,25 +16756,6 @@
               <a:rPr lang="en-US" dirty="0"/>
               <a:t>What Makes a Good Ensemble?</a:t>
             </a:r>
-          </a:p>
-        </p:txBody>
-      </p:sp>
-      <p:sp>
-        <p:nvSpPr>
-          <p:cNvPr id="3" name="Content Placeholder 2"/>
-          <p:cNvSpPr>
-            <a:spLocks noGrp="1"/>
-          </p:cNvSpPr>
-          <p:nvPr>
-            <p:ph idx="1"/>
-          </p:nvPr>
-        </p:nvSpPr>
-        <p:spPr/>
-        <p:txBody>
-          <a:bodyPr/>
-          <a:lstStyle/>
-          <a:p>
-            <a:endParaRPr lang="en-US" dirty="0"/>
           </a:p>
         </p:txBody>
       </p:sp>

</xml_diff>